<commit_message>
complete block 3 notebook
</commit_message>
<xml_diff>
--- a/slides/block3.pptx
+++ b/slides/block3.pptx
@@ -7083,12 +7083,6 @@
           <a:p>
             <a:r>
               <a:rPr lang="en-KW" dirty="0"/>
-              <a:t>Load dataset</a:t>
-            </a:r>
-          </a:p>
-          <a:p>
-            <a:r>
-              <a:rPr lang="en-KW" dirty="0"/>
               <a:t>Z-score inputs</a:t>
             </a:r>
           </a:p>
@@ -7100,7 +7094,7 @@
           </a:p>
           <a:p>
             <a:r>
-              <a:rPr lang="en-KW"/>
+              <a:rPr lang="en-KW" dirty="0"/>
               <a:t>Try different input features</a:t>
             </a:r>
           </a:p>

</xml_diff>